<commit_message>
minor adjustments to the power point
</commit_message>
<xml_diff>
--- a/docs/model_assumptions_wind/nrel_dwind_model_assumptions_2015_10_27.pptx
+++ b/docs/model_assumptions_wind/nrel_dwind_model_assumptions_2015_10_27.pptx
@@ -4940,10 +4940,15 @@
             <p:ph type="body" sz="quarter" idx="12"/>
           </p:nvPr>
         </p:nvSpPr>
-        <p:spPr/>
+        <p:spPr>
+          <a:xfrm>
+            <a:off x="3657600" y="3810000"/>
+            <a:ext cx="4648200" cy="2667000"/>
+          </a:xfrm>
+        </p:spPr>
         <p:txBody>
           <a:bodyPr>
-            <a:normAutofit fontScale="85000" lnSpcReduction="10000"/>
+            <a:normAutofit fontScale="92500" lnSpcReduction="10000"/>
           </a:bodyPr>
           <a:lstStyle/>
           <a:p>
@@ -4951,7 +4956,6 @@
               <a:rPr lang="en-US" dirty="0" smtClean="0"/>
               <a:t>Presentation to DOE Wind Program</a:t>
             </a:r>
-            <a:endParaRPr lang="en-US" dirty="0" smtClean="0"/>
           </a:p>
           <a:p>
             <a:r>
@@ -4972,7 +4976,15 @@
             </a:r>
             <a:r>
               <a:rPr lang="en-US" dirty="0" smtClean="0"/>
-              <a:t>, and Mike Gleason</a:t>
+              <a:t>, </a:t>
+            </a:r>
+            <a:r>
+              <a:rPr lang="en-US" dirty="0" smtClean="0"/>
+              <a:t>Eric Lantz, and </a:t>
+            </a:r>
+            <a:r>
+              <a:rPr lang="en-US" smtClean="0"/>
+              <a:t>Mike Gleason</a:t>
             </a:r>
             <a:endParaRPr lang="en-US" dirty="0" smtClean="0"/>
           </a:p>
@@ -7269,7 +7281,6 @@
               <a:rPr lang="en-US" sz="3200" dirty="0"/>
               <a:t>Turbine Performance Improvement Schedule</a:t>
             </a:r>
-            <a:endParaRPr lang="en-US" sz="3200" dirty="0"/>
           </a:p>
         </p:txBody>
       </p:sp>
@@ -18404,7 +18415,6 @@
               <a:rPr lang="en-US" sz="2000" dirty="0" smtClean="0"/>
               <a:t>]</a:t>
             </a:r>
-            <a:endParaRPr lang="en-US" sz="2000" dirty="0" smtClean="0"/>
           </a:p>
         </p:txBody>
       </p:sp>
@@ -23536,7 +23546,6 @@
               <a:rPr lang="en-US" dirty="0" smtClean="0"/>
               <a:t>Review by TRC</a:t>
             </a:r>
-            <a:endParaRPr lang="en-US" dirty="0" smtClean="0"/>
           </a:p>
         </p:txBody>
       </p:sp>
@@ -27479,7 +27488,6 @@
               <a:rPr lang="en-US" dirty="0" smtClean="0"/>
               <a:t>Review by TRC</a:t>
             </a:r>
-            <a:endParaRPr lang="en-US" dirty="0" smtClean="0"/>
           </a:p>
         </p:txBody>
       </p:sp>
@@ -33873,23 +33881,7 @@
           <a:p>
             <a:r>
               <a:rPr lang="en-US" dirty="0" smtClean="0"/>
-              <a:t>Identify and </a:t>
-            </a:r>
-            <a:r>
-              <a:rPr lang="en-US" dirty="0" smtClean="0"/>
-              <a:t>discuss </a:t>
-            </a:r>
-            <a:r>
-              <a:rPr lang="en-US" dirty="0" smtClean="0"/>
-              <a:t>areas for improvement and gain DOE guidance </a:t>
-            </a:r>
-            <a:r>
-              <a:rPr lang="en-US" dirty="0" smtClean="0"/>
-              <a:t>on plans for </a:t>
-            </a:r>
-            <a:r>
-              <a:rPr lang="en-US" dirty="0" smtClean="0"/>
-              <a:t>resolution</a:t>
+              <a:t>Identify and discuss areas for improvement and gain DOE guidance on plans for resolution</a:t>
             </a:r>
             <a:endParaRPr lang="en-US" dirty="0"/>
           </a:p>
@@ -37283,11 +37275,6 @@
               </a:rPr>
               <a:t>a conclusions/summary slide?</a:t>
             </a:r>
-            <a:endParaRPr lang="en-US" dirty="0">
-              <a:solidFill>
-                <a:srgbClr val="FF0000"/>
-              </a:solidFill>
-            </a:endParaRPr>
           </a:p>
         </p:txBody>
       </p:sp>
@@ -37531,11 +37518,7 @@
           <a:p>
             <a:r>
               <a:rPr lang="en-US" dirty="0" smtClean="0"/>
-              <a:t>Review </a:t>
-            </a:r>
-            <a:r>
-              <a:rPr lang="en-US" dirty="0" smtClean="0"/>
-              <a:t>core framework for modeling diffusion of technology</a:t>
+              <a:t>Review core framework for modeling diffusion of technology</a:t>
             </a:r>
           </a:p>
           <a:p>
@@ -42349,7 +42332,6 @@
               <a:rPr lang="en-US" dirty="0" smtClean="0"/>
               <a:t>4 representing current turbines</a:t>
             </a:r>
-            <a:endParaRPr lang="en-US" dirty="0" smtClean="0"/>
           </a:p>
           <a:p>
             <a:pPr marL="0" indent="0">

</xml_diff>